<commit_message>
Added the final version of our early presentation
</commit_message>
<xml_diff>
--- a/Documentation/Achievatron_PowerPoint.pptx
+++ b/Documentation/Achievatron_PowerPoint.pptx
@@ -5,7 +5,7 @@
     <p:sldMasterId id="2147483912" r:id="rId1"/>
   </p:sldMasterIdLst>
   <p:notesMasterIdLst>
-    <p:notesMasterId r:id="rId11"/>
+    <p:notesMasterId r:id="rId12"/>
   </p:notesMasterIdLst>
   <p:sldIdLst>
     <p:sldId id="256" r:id="rId2"/>
@@ -14,9 +14,10 @@
     <p:sldId id="259" r:id="rId5"/>
     <p:sldId id="262" r:id="rId6"/>
     <p:sldId id="263" r:id="rId7"/>
-    <p:sldId id="264" r:id="rId8"/>
-    <p:sldId id="265" r:id="rId9"/>
-    <p:sldId id="266" r:id="rId10"/>
+    <p:sldId id="267" r:id="rId8"/>
+    <p:sldId id="264" r:id="rId9"/>
+    <p:sldId id="265" r:id="rId10"/>
+    <p:sldId id="266" r:id="rId11"/>
   </p:sldIdLst>
   <p:sldSz cx="9144000" cy="6858000" type="screen4x3"/>
   <p:notesSz cx="6858000" cy="9144000"/>
@@ -115,6 +116,22 @@
       </a:defRPr>
     </a:lvl9pPr>
   </p:defaultTextStyle>
+  <p:extLst>
+    <p:ext uri="{EFAFB233-063F-42B5-8137-9DF3F51BA10A}">
+      <p15:sldGuideLst xmlns:p15="http://schemas.microsoft.com/office/powerpoint/2012/main">
+        <p15:guide id="1" orient="horz" pos="2160">
+          <p15:clr>
+            <a:srgbClr val="A4A3A4"/>
+          </p15:clr>
+        </p15:guide>
+        <p15:guide id="2" pos="2880">
+          <p15:clr>
+            <a:srgbClr val="A4A3A4"/>
+          </p15:clr>
+        </p15:guide>
+      </p15:sldGuideLst>
+    </p:ext>
+  </p:extLst>
 </p:presentation>
 </file>
 
@@ -200,7 +217,7 @@
           <a:p>
             <a:fld id="{B9D02322-5441-2F49-81BC-60BCB4A1F836}" type="datetimeFigureOut">
               <a:rPr lang="en-US" smtClean="0"/>
-              <a:t>2014-10-06</a:t>
+              <a:t>10/7/2014</a:t>
             </a:fld>
             <a:endParaRPr lang="en-US"/>
           </a:p>
@@ -746,7 +763,7 @@
             <a:fld id="{451DEABC-D766-4322-8E78-B830FAE35C72}" type="datetime4">
               <a:rPr lang="en-US" smtClean="0"/>
               <a:pPr/>
-              <a:t>October 6, 2014</a:t>
+              <a:t>October 7, 2014</a:t>
             </a:fld>
             <a:endParaRPr lang="en-US" dirty="0"/>
           </a:p>
@@ -1013,7 +1030,7 @@
             <a:fld id="{F3131F9E-604E-4343-9F29-EF72E8231CAD}" type="datetime4">
               <a:rPr lang="en-US" smtClean="0"/>
               <a:pPr/>
-              <a:t>October 6, 2014</a:t>
+              <a:t>October 7, 2014</a:t>
             </a:fld>
             <a:endParaRPr lang="en-US"/>
           </a:p>
@@ -1190,7 +1207,7 @@
             <a:fld id="{34A8E1CE-37F8-4102-8DF9-852A0A51F293}" type="datetime4">
               <a:rPr lang="en-US" smtClean="0"/>
               <a:pPr/>
-              <a:t>October 6, 2014</a:t>
+              <a:t>October 7, 2014</a:t>
             </a:fld>
             <a:endParaRPr lang="en-US"/>
           </a:p>
@@ -1357,7 +1374,7 @@
             <a:fld id="{93333F43-3E86-47E4-BFBB-2476D384E1C6}" type="datetime4">
               <a:rPr lang="en-US" smtClean="0"/>
               <a:pPr/>
-              <a:t>October 6, 2014</a:t>
+              <a:t>October 7, 2014</a:t>
             </a:fld>
             <a:endParaRPr lang="en-US"/>
           </a:p>
@@ -1608,7 +1625,7 @@
             <a:fld id="{751663BA-01FC-4367-B6F3-ABB2645D55F1}" type="datetime4">
               <a:rPr lang="en-US" smtClean="0"/>
               <a:pPr/>
-              <a:t>October 6, 2014</a:t>
+              <a:t>October 7, 2014</a:t>
             </a:fld>
             <a:endParaRPr lang="en-US" dirty="0"/>
           </a:p>
@@ -1893,7 +1910,7 @@
             <a:fld id="{79B19C71-EC74-44AF-B27E-FC7DC3C3A61D}" type="datetime4">
               <a:rPr lang="en-US" smtClean="0"/>
               <a:pPr/>
-              <a:t>October 6, 2014</a:t>
+              <a:t>October 7, 2014</a:t>
             </a:fld>
             <a:endParaRPr lang="en-US"/>
           </a:p>
@@ -2334,7 +2351,7 @@
             <a:fld id="{6A5CDA29-3CBE-48EA-92AE-A996835462BA}" type="datetime4">
               <a:rPr lang="en-US" smtClean="0"/>
               <a:pPr/>
-              <a:t>October 6, 2014</a:t>
+              <a:t>October 7, 2014</a:t>
             </a:fld>
             <a:endParaRPr lang="en-US"/>
           </a:p>
@@ -2449,7 +2466,7 @@
             <a:fld id="{E29EC054-3869-4501-B163-1BBFDE8DCE04}" type="datetime4">
               <a:rPr lang="en-US" smtClean="0"/>
               <a:pPr/>
-              <a:t>October 6, 2014</a:t>
+              <a:t>October 7, 2014</a:t>
             </a:fld>
             <a:endParaRPr lang="en-US"/>
           </a:p>
@@ -2541,7 +2558,7 @@
             <a:fld id="{0A63D831-56C1-49CF-8EF7-8B9A98402BCD}" type="datetime4">
               <a:rPr lang="en-US" smtClean="0"/>
               <a:pPr/>
-              <a:t>October 6, 2014</a:t>
+              <a:t>October 7, 2014</a:t>
             </a:fld>
             <a:endParaRPr lang="en-US"/>
           </a:p>
@@ -2785,7 +2802,7 @@
             <a:fld id="{6EAD5615-7F4F-4584-84D5-CC95918C321F}" type="datetime4">
               <a:rPr lang="en-US" smtClean="0"/>
               <a:pPr/>
-              <a:t>October 6, 2014</a:t>
+              <a:t>October 7, 2014</a:t>
             </a:fld>
             <a:endParaRPr lang="en-US"/>
           </a:p>
@@ -3081,7 +3098,7 @@
             <a:fld id="{76EEA923-9BEE-48CE-9F28-5B525F399BAD}" type="datetime4">
               <a:rPr lang="en-US" smtClean="0"/>
               <a:pPr/>
-              <a:t>October 6, 2014</a:t>
+              <a:t>October 7, 2014</a:t>
             </a:fld>
             <a:endParaRPr lang="en-US"/>
           </a:p>
@@ -3377,7 +3394,7 @@
             <a:fld id="{17D0EFEE-2756-4A20-BF2A-63F0A94F99AC}" type="datetime4">
               <a:rPr lang="en-US" smtClean="0"/>
               <a:pPr/>
-              <a:t>October 6, 2014</a:t>
+              <a:t>October 7, 2014</a:t>
             </a:fld>
             <a:endParaRPr lang="en-US" dirty="0"/>
           </a:p>
@@ -3850,6 +3867,20 @@
 <file path=ppt/slides/slide1.xml><?xml version="1.0" encoding="utf-8"?>
 <p:sld xmlns:a="http://schemas.openxmlformats.org/drawingml/2006/main" xmlns:r="http://schemas.openxmlformats.org/officeDocument/2006/relationships" xmlns:p="http://schemas.openxmlformats.org/presentationml/2006/main">
   <p:cSld>
+    <p:bg>
+      <p:bgPr>
+        <a:blipFill dpi="0" rotWithShape="1">
+          <a:blip r:embed="rId2">
+            <a:lum/>
+          </a:blip>
+          <a:srcRect/>
+          <a:stretch>
+            <a:fillRect l="-17000" r="-17000"/>
+          </a:stretch>
+        </a:blipFill>
+        <a:effectLst/>
+      </p:bgPr>
+    </p:bg>
     <p:spTree>
       <p:nvGrpSpPr>
         <p:cNvPr id="1" name=""/>
@@ -3866,29 +3897,6 @@
       </p:grpSpPr>
       <p:sp>
         <p:nvSpPr>
-          <p:cNvPr id="2" name="Title 1"/>
-          <p:cNvSpPr>
-            <a:spLocks noGrp="1"/>
-          </p:cNvSpPr>
-          <p:nvPr>
-            <p:ph type="ctrTitle"/>
-          </p:nvPr>
-        </p:nvSpPr>
-        <p:spPr/>
-        <p:txBody>
-          <a:bodyPr/>
-          <a:lstStyle/>
-          <a:p>
-            <a:r>
-              <a:rPr lang="en-US" sz="6000" smtClean="0"/>
-              <a:t>Achievatron unlimited</a:t>
-            </a:r>
-            <a:endParaRPr lang="en-US" sz="6000" dirty="0"/>
-          </a:p>
-        </p:txBody>
-      </p:sp>
-      <p:sp>
-        <p:nvSpPr>
           <p:cNvPr id="3" name="Subtitle 2"/>
           <p:cNvSpPr>
             <a:spLocks noGrp="1"/>
@@ -3897,12 +3905,34 @@
             <p:ph type="subTitle" idx="1"/>
           </p:nvPr>
         </p:nvSpPr>
-        <p:spPr/>
-        <p:txBody>
-          <a:bodyPr/>
-          <a:lstStyle/>
-          <a:p>
-            <a:endParaRPr lang="en-US" dirty="0"/>
+        <p:spPr>
+          <a:xfrm>
+            <a:off x="594911" y="5940847"/>
+            <a:ext cx="8108414" cy="914400"/>
+          </a:xfrm>
+        </p:spPr>
+        <p:txBody>
+          <a:bodyPr>
+            <a:normAutofit/>
+          </a:bodyPr>
+          <a:lstStyle/>
+          <a:p>
+            <a:r>
+              <a:rPr lang="en-US" dirty="0" smtClean="0"/>
+              <a:t>Iain workman, john mason, </a:t>
+            </a:r>
+            <a:r>
+              <a:rPr lang="en-US" dirty="0" smtClean="0"/>
+              <a:t>Matthew </a:t>
+            </a:r>
+            <a:r>
+              <a:rPr lang="en-US" dirty="0" err="1" smtClean="0"/>
+              <a:t>galbraith</a:t>
+            </a:r>
+            <a:r>
+              <a:rPr lang="en-US" dirty="0" smtClean="0"/>
+              <a:t>, Mitchell Corbett, ryan la forge</a:t>
+            </a:r>
           </a:p>
         </p:txBody>
       </p:sp>
@@ -3916,6 +3946,143 @@
   <p:clrMapOvr>
     <a:masterClrMapping/>
   </p:clrMapOvr>
+  <p:timing>
+    <p:tnLst>
+      <p:par>
+        <p:cTn id="1" dur="indefinite" restart="never" nodeType="tmRoot"/>
+      </p:par>
+    </p:tnLst>
+  </p:timing>
+</p:sld>
+</file>
+
+<file path=ppt/slides/slide10.xml><?xml version="1.0" encoding="utf-8"?>
+<p:sld xmlns:a="http://schemas.openxmlformats.org/drawingml/2006/main" xmlns:r="http://schemas.openxmlformats.org/officeDocument/2006/relationships" xmlns:p="http://schemas.openxmlformats.org/presentationml/2006/main">
+  <p:cSld>
+    <p:spTree>
+      <p:nvGrpSpPr>
+        <p:cNvPr id="1" name=""/>
+        <p:cNvGrpSpPr/>
+        <p:nvPr/>
+      </p:nvGrpSpPr>
+      <p:grpSpPr>
+        <a:xfrm>
+          <a:off x="0" y="0"/>
+          <a:ext cx="0" cy="0"/>
+          <a:chOff x="0" y="0"/>
+          <a:chExt cx="0" cy="0"/>
+        </a:xfrm>
+      </p:grpSpPr>
+      <p:sp>
+        <p:nvSpPr>
+          <p:cNvPr id="2" name="Title 1"/>
+          <p:cNvSpPr>
+            <a:spLocks noGrp="1"/>
+          </p:cNvSpPr>
+          <p:nvPr>
+            <p:ph type="title"/>
+          </p:nvPr>
+        </p:nvSpPr>
+        <p:spPr/>
+        <p:txBody>
+          <a:bodyPr/>
+          <a:lstStyle/>
+          <a:p>
+            <a:r>
+              <a:rPr lang="en-US" dirty="0" smtClean="0"/>
+              <a:t>conclusion</a:t>
+            </a:r>
+            <a:endParaRPr lang="en-US" dirty="0"/>
+          </a:p>
+        </p:txBody>
+      </p:sp>
+      <p:sp>
+        <p:nvSpPr>
+          <p:cNvPr id="3" name="Content Placeholder 2"/>
+          <p:cNvSpPr>
+            <a:spLocks noGrp="1"/>
+          </p:cNvSpPr>
+          <p:nvPr>
+            <p:ph idx="1"/>
+          </p:nvPr>
+        </p:nvSpPr>
+        <p:spPr/>
+        <p:txBody>
+          <a:bodyPr>
+            <a:normAutofit lnSpcReduction="10000"/>
+          </a:bodyPr>
+          <a:lstStyle/>
+          <a:p>
+            <a:pPr marL="342900" indent="-342900">
+              <a:buFont typeface="Arial"/>
+              <a:buChar char="•"/>
+            </a:pPr>
+            <a:r>
+              <a:rPr lang="en-US" dirty="0" smtClean="0"/>
+              <a:t>We at </a:t>
+            </a:r>
+            <a:r>
+              <a:rPr lang="en-US" dirty="0" err="1" smtClean="0"/>
+              <a:t>Achievatron</a:t>
+            </a:r>
+            <a:r>
+              <a:rPr lang="en-US" dirty="0" smtClean="0"/>
+              <a:t> Unlimited believe that this software we are creating can have real use in the private filming sector.</a:t>
+            </a:r>
+          </a:p>
+          <a:p>
+            <a:endParaRPr lang="en-US" dirty="0"/>
+          </a:p>
+          <a:p>
+            <a:pPr marL="342900" indent="-342900">
+              <a:buFont typeface="Arial"/>
+              <a:buChar char="•"/>
+            </a:pPr>
+            <a:r>
+              <a:rPr lang="en-US" dirty="0" smtClean="0"/>
+              <a:t>We chose a small target market because we want to learn to develop specific software for a unique set of needs</a:t>
+            </a:r>
+          </a:p>
+          <a:p>
+            <a:pPr marL="342900" indent="-342900">
+              <a:buFont typeface="Arial"/>
+              <a:buChar char="•"/>
+            </a:pPr>
+            <a:endParaRPr lang="en-US" dirty="0"/>
+          </a:p>
+          <a:p>
+            <a:pPr marL="342900" indent="-342900">
+              <a:buFont typeface="Arial"/>
+              <a:buChar char="•"/>
+            </a:pPr>
+            <a:r>
+              <a:rPr lang="en-US" dirty="0" smtClean="0"/>
+              <a:t>If it appears we have not been ambitious enough remember, promise a little but give a lot. This presentation has outlined *only* what we feel we can reasonably and comfortably create given the time restrictions for this class. It has not included some of our more high reaching goals. </a:t>
+            </a:r>
+            <a:endParaRPr lang="en-US" dirty="0"/>
+          </a:p>
+          <a:p>
+            <a:endParaRPr lang="en-US" dirty="0"/>
+          </a:p>
+        </p:txBody>
+      </p:sp>
+    </p:spTree>
+    <p:extLst>
+      <p:ext uri="{BB962C8B-B14F-4D97-AF65-F5344CB8AC3E}">
+        <p14:creationId xmlns:p14="http://schemas.microsoft.com/office/powerpoint/2010/main" val="1048451117"/>
+      </p:ext>
+    </p:extLst>
+  </p:cSld>
+  <p:clrMapOvr>
+    <a:masterClrMapping/>
+  </p:clrMapOvr>
+  <p:timing>
+    <p:tnLst>
+      <p:par>
+        <p:cTn id="1" dur="indefinite" restart="never" nodeType="tmRoot"/>
+      </p:par>
+    </p:tnLst>
+  </p:timing>
 </p:sld>
 </file>
 
@@ -3981,16 +4148,12 @@
               <a:buChar char="•"/>
             </a:pPr>
             <a:r>
+              <a:rPr lang="en-CA" dirty="0" smtClean="0"/>
+              <a:t>Design software </a:t>
+            </a:r>
+            <a:r>
               <a:rPr lang="en-CA" dirty="0"/>
-              <a:t>S</a:t>
-            </a:r>
-            <a:r>
-              <a:rPr lang="en-CA" dirty="0" smtClean="0"/>
-              <a:t>oftware </a:t>
-            </a:r>
-            <a:r>
-              <a:rPr lang="en-CA" dirty="0"/>
-              <a:t>designed to assist the Producer of a small-scale film production company</a:t>
+              <a:t>to assist the Producer of a small-scale film production company</a:t>
             </a:r>
             <a:r>
               <a:rPr lang="en-CA" dirty="0" smtClean="0"/>
@@ -4004,7 +4167,15 @@
             </a:pPr>
             <a:r>
               <a:rPr lang="en-CA" dirty="0" smtClean="0"/>
-              <a:t>There are many things to keep track of throughout the production of a movie. Our system aims to make the producers book-keeping duties as automated as possible allowing him or her to focus on the film itself and not the details of its realization.</a:t>
+              <a:t>There are many things to keep track of throughout the production of a movie. Our system aims to make the producer’s book-keeping duties as automated as possible allowing him or her to focus on the film itself and not </a:t>
+            </a:r>
+            <a:r>
+              <a:rPr lang="en-CA" dirty="0" smtClean="0"/>
+              <a:t>the details </a:t>
+            </a:r>
+            <a:r>
+              <a:rPr lang="en-CA" dirty="0" smtClean="0"/>
+              <a:t>of its realization.</a:t>
             </a:r>
           </a:p>
         </p:txBody>
@@ -4019,6 +4190,13 @@
   <p:clrMapOvr>
     <a:masterClrMapping/>
   </p:clrMapOvr>
+  <p:timing>
+    <p:tnLst>
+      <p:par>
+        <p:cTn id="1" dur="indefinite" restart="never" nodeType="tmRoot"/>
+      </p:par>
+    </p:tnLst>
+  </p:timing>
 </p:sld>
 </file>
 
@@ -4146,7 +4324,7 @@
             </a:r>
           </a:p>
           <a:p>
-            <a:endParaRPr lang="en-US" dirty="0"/>
+            <a:endParaRPr lang="en-US" dirty="0" smtClean="0"/>
           </a:p>
           <a:p>
             <a:pPr marL="342900" indent="-342900">
@@ -4167,6 +4345,13 @@
   <p:clrMapOvr>
     <a:masterClrMapping/>
   </p:clrMapOvr>
+  <p:timing>
+    <p:tnLst>
+      <p:par>
+        <p:cTn id="1" dur="indefinite" restart="never" nodeType="tmRoot"/>
+      </p:par>
+    </p:tnLst>
+  </p:timing>
 </p:sld>
 </file>
 
@@ -4397,6 +4582,13 @@
   <p:clrMapOvr>
     <a:masterClrMapping/>
   </p:clrMapOvr>
+  <p:timing>
+    <p:tnLst>
+      <p:par>
+        <p:cTn id="1" dur="indefinite" restart="never" nodeType="tmRoot"/>
+      </p:par>
+    </p:tnLst>
+  </p:timing>
 </p:sld>
 </file>
 
@@ -4503,6 +4695,13 @@
   <p:clrMapOvr>
     <a:masterClrMapping/>
   </p:clrMapOvr>
+  <p:timing>
+    <p:tnLst>
+      <p:par>
+        <p:cTn id="1" dur="indefinite" restart="never" nodeType="tmRoot"/>
+      </p:par>
+    </p:tnLst>
+  </p:timing>
 </p:sld>
 </file>
 
@@ -4580,12 +4779,12 @@
           <a:graphicData uri="http://schemas.openxmlformats.org/presentationml/2006/ole">
             <mc:AlternateContent xmlns:mc="http://schemas.openxmlformats.org/markup-compatibility/2006">
               <mc:Choice xmlns:v="urn:schemas-microsoft-com:vml" Requires="v">
-                <p:oleObj spid="_x0000_s1027" name="Document" r:id="rId3" imgW="6477000" imgH="8318500" progId="Word.Document.12">
+                <p:oleObj spid="_x0000_s1032" name="Document" r:id="rId4" imgW="6477000" imgH="8318500" progId="Word.Document.12">
                   <p:embed/>
                 </p:oleObj>
               </mc:Choice>
               <mc:Fallback>
-                <p:oleObj name="Document" r:id="rId3" imgW="6477000" imgH="8318500" progId="Word.Document.12">
+                <p:oleObj name="Document" r:id="rId4" imgW="6477000" imgH="8318500" progId="Word.Document.12">
                   <p:embed/>
                   <p:pic>
                     <p:nvPicPr>
@@ -4594,7 +4793,7 @@
                       <p:nvPr/>
                     </p:nvPicPr>
                     <p:blipFill>
-                      <a:blip r:embed="rId4"/>
+                      <a:blip r:embed="rId5"/>
                       <a:stretch>
                         <a:fillRect/>
                       </a:stretch>
@@ -4625,6 +4824,13 @@
   <p:clrMapOvr>
     <a:masterClrMapping/>
   </p:clrMapOvr>
+  <p:timing>
+    <p:tnLst>
+      <p:par>
+        <p:cTn id="1" dur="indefinite" restart="never" nodeType="tmRoot"/>
+      </p:par>
+    </p:tnLst>
+  </p:timing>
 </p:sld>
 </file>
 
@@ -4655,16 +4861,21 @@
             <p:ph type="title"/>
           </p:nvPr>
         </p:nvSpPr>
-        <p:spPr/>
-        <p:txBody>
-          <a:bodyPr/>
-          <a:lstStyle/>
-          <a:p>
-            <a:r>
-              <a:rPr lang="en-US" dirty="0" smtClean="0"/>
-              <a:t>planning</a:t>
-            </a:r>
-            <a:endParaRPr lang="en-US" dirty="0"/>
+        <p:spPr>
+          <a:xfrm>
+            <a:off x="742071" y="121186"/>
+            <a:ext cx="7620001" cy="841272"/>
+          </a:xfrm>
+        </p:spPr>
+        <p:txBody>
+          <a:bodyPr/>
+          <a:lstStyle/>
+          <a:p>
+            <a:r>
+              <a:rPr lang="en-CA" dirty="0" smtClean="0"/>
+              <a:t>Work allocation cont’d</a:t>
+            </a:r>
+            <a:endParaRPr lang="en-CA" dirty="0"/>
           </a:p>
         </p:txBody>
       </p:sp>
@@ -4678,96 +4889,323 @@
             <p:ph idx="1"/>
           </p:nvPr>
         </p:nvSpPr>
-        <p:spPr/>
-        <p:txBody>
-          <a:bodyPr/>
-          <a:lstStyle/>
-          <a:p>
-            <a:pPr marL="342900" indent="-342900">
-              <a:buFont typeface="Arial"/>
-              <a:buChar char="•"/>
-            </a:pPr>
-            <a:r>
-              <a:rPr lang="en-US" dirty="0" smtClean="0"/>
-              <a:t>Weekly meetings to evaluate and discuss progress.</a:t>
-            </a:r>
-          </a:p>
-          <a:p>
-            <a:pPr marL="342900" indent="-342900">
-              <a:buFont typeface="Arial"/>
-              <a:buChar char="•"/>
-            </a:pPr>
-            <a:r>
-              <a:rPr lang="en-US" dirty="0" smtClean="0"/>
-              <a:t>Weekly goals to ensure linear progress.</a:t>
-            </a:r>
-          </a:p>
-          <a:p>
-            <a:pPr marL="342900" indent="-342900">
-              <a:buFont typeface="Arial"/>
-              <a:buChar char="•"/>
-            </a:pPr>
-            <a:r>
-              <a:rPr lang="en-US" dirty="0" smtClean="0"/>
-              <a:t>Paired programming:</a:t>
-            </a:r>
-          </a:p>
-          <a:p>
-            <a:pPr marL="800100" lvl="1" indent="-342900">
-              <a:buFont typeface="Arial"/>
-              <a:buChar char="•"/>
-            </a:pPr>
-            <a:r>
-              <a:rPr lang="en-US" dirty="0" smtClean="0"/>
-              <a:t>To ensure clear understandable code.</a:t>
-            </a:r>
-          </a:p>
-          <a:p>
-            <a:pPr marL="800100" lvl="1" indent="-342900">
-              <a:buFont typeface="Arial"/>
-              <a:buChar char="•"/>
-            </a:pPr>
-            <a:r>
-              <a:rPr lang="en-US" dirty="0" smtClean="0"/>
-              <a:t>To practice working in small teams.</a:t>
-            </a:r>
-          </a:p>
-          <a:p>
-            <a:pPr marL="800100" lvl="1" indent="-342900">
-              <a:buFont typeface="Arial"/>
-              <a:buChar char="•"/>
-            </a:pPr>
-            <a:r>
-              <a:rPr lang="en-US" dirty="0" smtClean="0"/>
-              <a:t>Ensures a broader understanding of the project for each individual.</a:t>
-            </a:r>
-          </a:p>
-          <a:p>
-            <a:pPr marL="342900" indent="-342900">
-              <a:buFont typeface="Arial"/>
-              <a:buChar char="•"/>
-            </a:pPr>
-            <a:endParaRPr lang="en-US" dirty="0" smtClean="0"/>
-          </a:p>
-          <a:p>
-            <a:pPr marL="342900" indent="-342900">
-              <a:buFont typeface="Arial"/>
-              <a:buChar char="•"/>
-            </a:pPr>
-            <a:endParaRPr lang="en-US" dirty="0"/>
+        <p:spPr>
+          <a:xfrm>
+            <a:off x="291947" y="1305508"/>
+            <a:ext cx="3244467" cy="1602966"/>
+          </a:xfrm>
+        </p:spPr>
+        <p:txBody>
+          <a:bodyPr>
+            <a:noAutofit/>
+          </a:bodyPr>
+          <a:lstStyle/>
+          <a:p>
+            <a:r>
+              <a:rPr lang="en-CA" sz="1800" dirty="0" smtClean="0"/>
+              <a:t>Volunteer management</a:t>
+            </a:r>
+            <a:br>
+              <a:rPr lang="en-CA" sz="1800" dirty="0" smtClean="0"/>
+            </a:br>
+            <a:r>
+              <a:rPr lang="en-CA" sz="1800" b="0" dirty="0" smtClean="0"/>
+              <a:t>Assigned to: John Mason</a:t>
+            </a:r>
+            <a:br>
+              <a:rPr lang="en-CA" sz="1800" b="0" dirty="0" smtClean="0"/>
+            </a:br>
+            <a:r>
+              <a:rPr lang="en-CA" sz="1800" b="0" dirty="0" smtClean="0"/>
+              <a:t/>
+            </a:r>
+            <a:br>
+              <a:rPr lang="en-CA" sz="1800" b="0" dirty="0" smtClean="0"/>
+            </a:br>
+            <a:r>
+              <a:rPr lang="en-CA" sz="1800" b="0" dirty="0" smtClean="0"/>
+              <a:t>Duties: manage the addition and updating of volunteers and equipment.</a:t>
+            </a:r>
+            <a:endParaRPr lang="en-CA" sz="1800" b="0" dirty="0"/>
+          </a:p>
+        </p:txBody>
+      </p:sp>
+      <p:sp>
+        <p:nvSpPr>
+          <p:cNvPr id="4" name="TextBox 3"/>
+          <p:cNvSpPr txBox="1"/>
+          <p:nvPr/>
+        </p:nvSpPr>
+        <p:spPr>
+          <a:xfrm>
+            <a:off x="4649118" y="1275733"/>
+            <a:ext cx="4352474" cy="1754326"/>
+          </a:xfrm>
+          <a:prstGeom prst="rect">
+            <a:avLst/>
+          </a:prstGeom>
+          <a:noFill/>
+        </p:spPr>
+        <p:txBody>
+          <a:bodyPr wrap="none" rtlCol="0">
+            <a:spAutoFit/>
+          </a:bodyPr>
+          <a:lstStyle/>
+          <a:p>
+            <a:r>
+              <a:rPr lang="en-CA" b="1" dirty="0" smtClean="0"/>
+              <a:t>Script/Scene management</a:t>
+            </a:r>
+            <a:r>
+              <a:rPr lang="en-CA" dirty="0" smtClean="0"/>
+              <a:t/>
+            </a:r>
+            <a:br>
+              <a:rPr lang="en-CA" dirty="0" smtClean="0"/>
+            </a:br>
+            <a:r>
+              <a:rPr lang="en-CA" dirty="0" smtClean="0"/>
+              <a:t>Assigned to: Ryan La Forge</a:t>
+            </a:r>
+            <a:br>
+              <a:rPr lang="en-CA" dirty="0" smtClean="0"/>
+            </a:br>
+            <a:r>
+              <a:rPr lang="en-CA" dirty="0" smtClean="0"/>
+              <a:t/>
+            </a:r>
+            <a:br>
+              <a:rPr lang="en-CA" dirty="0" smtClean="0"/>
+            </a:br>
+            <a:r>
+              <a:rPr lang="en-CA" dirty="0" smtClean="0"/>
+              <a:t>Duties: Manage scripts, scenes, and the </a:t>
+            </a:r>
+            <a:r>
+              <a:rPr lang="en-CA" dirty="0"/>
+              <a:t/>
+            </a:r>
+            <a:br>
+              <a:rPr lang="en-CA" dirty="0"/>
+            </a:br>
+            <a:r>
+              <a:rPr lang="en-CA" dirty="0" smtClean="0"/>
+              <a:t>interactions between scenes and </a:t>
+            </a:r>
+            <a:br>
+              <a:rPr lang="en-CA" dirty="0" smtClean="0"/>
+            </a:br>
+            <a:r>
+              <a:rPr lang="en-CA" dirty="0" smtClean="0"/>
+              <a:t>volunteers/equipment</a:t>
+            </a:r>
+            <a:endParaRPr lang="en-CA" dirty="0"/>
+          </a:p>
+        </p:txBody>
+      </p:sp>
+      <p:sp>
+        <p:nvSpPr>
+          <p:cNvPr id="5" name="TextBox 4"/>
+          <p:cNvSpPr txBox="1"/>
+          <p:nvPr/>
+        </p:nvSpPr>
+        <p:spPr>
+          <a:xfrm>
+            <a:off x="291947" y="3251524"/>
+            <a:ext cx="3839513" cy="1477328"/>
+          </a:xfrm>
+          <a:prstGeom prst="rect">
+            <a:avLst/>
+          </a:prstGeom>
+          <a:noFill/>
+        </p:spPr>
+        <p:txBody>
+          <a:bodyPr wrap="none" rtlCol="0">
+            <a:spAutoFit/>
+          </a:bodyPr>
+          <a:lstStyle/>
+          <a:p>
+            <a:r>
+              <a:rPr lang="en-CA" b="1" dirty="0" smtClean="0"/>
+              <a:t>Timetable Management</a:t>
+            </a:r>
+            <a:r>
+              <a:rPr lang="en-CA" dirty="0" smtClean="0"/>
+              <a:t/>
+            </a:r>
+            <a:br>
+              <a:rPr lang="en-CA" dirty="0" smtClean="0"/>
+            </a:br>
+            <a:r>
+              <a:rPr lang="en-CA" dirty="0" smtClean="0"/>
+              <a:t>Assigned to: Iain Workman</a:t>
+            </a:r>
+            <a:br>
+              <a:rPr lang="en-CA" dirty="0" smtClean="0"/>
+            </a:br>
+            <a:r>
+              <a:rPr lang="en-CA" dirty="0" smtClean="0"/>
+              <a:t/>
+            </a:r>
+            <a:br>
+              <a:rPr lang="en-CA" dirty="0" smtClean="0"/>
+            </a:br>
+            <a:r>
+              <a:rPr lang="en-CA" dirty="0" smtClean="0"/>
+              <a:t>Duties: Manages the interactions </a:t>
+            </a:r>
+            <a:br>
+              <a:rPr lang="en-CA" dirty="0" smtClean="0"/>
+            </a:br>
+            <a:r>
+              <a:rPr lang="en-CA" dirty="0" smtClean="0"/>
+              <a:t>between the user and the schedule.</a:t>
+            </a:r>
+            <a:endParaRPr lang="en-CA" dirty="0"/>
+          </a:p>
+        </p:txBody>
+      </p:sp>
+      <p:sp>
+        <p:nvSpPr>
+          <p:cNvPr id="6" name="TextBox 5"/>
+          <p:cNvSpPr txBox="1"/>
+          <p:nvPr/>
+        </p:nvSpPr>
+        <p:spPr>
+          <a:xfrm>
+            <a:off x="4552071" y="3231571"/>
+            <a:ext cx="4185826" cy="1477328"/>
+          </a:xfrm>
+          <a:prstGeom prst="rect">
+            <a:avLst/>
+          </a:prstGeom>
+          <a:noFill/>
+        </p:spPr>
+        <p:txBody>
+          <a:bodyPr wrap="none" rtlCol="0">
+            <a:spAutoFit/>
+          </a:bodyPr>
+          <a:lstStyle/>
+          <a:p>
+            <a:r>
+              <a:rPr lang="en-CA" b="1" dirty="0" smtClean="0"/>
+              <a:t>Conflict Resolution Management</a:t>
+            </a:r>
+            <a:r>
+              <a:rPr lang="en-CA" dirty="0" smtClean="0"/>
+              <a:t/>
+            </a:r>
+            <a:br>
+              <a:rPr lang="en-CA" dirty="0" smtClean="0"/>
+            </a:br>
+            <a:r>
+              <a:rPr lang="en-CA" dirty="0" smtClean="0"/>
+              <a:t>Assigned to: Mitchell Corbett</a:t>
+            </a:r>
+            <a:br>
+              <a:rPr lang="en-CA" dirty="0" smtClean="0"/>
+            </a:br>
+            <a:r>
+              <a:rPr lang="en-CA" dirty="0" smtClean="0"/>
+              <a:t/>
+            </a:r>
+            <a:br>
+              <a:rPr lang="en-CA" dirty="0" smtClean="0"/>
+            </a:br>
+            <a:r>
+              <a:rPr lang="en-CA" dirty="0" smtClean="0"/>
+              <a:t>Duties: Automatic schedule generation </a:t>
+            </a:r>
+            <a:br>
+              <a:rPr lang="en-CA" dirty="0" smtClean="0"/>
+            </a:br>
+            <a:r>
+              <a:rPr lang="en-CA" dirty="0" smtClean="0"/>
+              <a:t>and conflict management. </a:t>
+            </a:r>
+            <a:endParaRPr lang="en-CA" dirty="0"/>
+          </a:p>
+        </p:txBody>
+      </p:sp>
+      <p:sp>
+        <p:nvSpPr>
+          <p:cNvPr id="7" name="TextBox 6"/>
+          <p:cNvSpPr txBox="1"/>
+          <p:nvPr/>
+        </p:nvSpPr>
+        <p:spPr>
+          <a:xfrm>
+            <a:off x="2123356" y="4903835"/>
+            <a:ext cx="5532284" cy="1477328"/>
+          </a:xfrm>
+          <a:prstGeom prst="rect">
+            <a:avLst/>
+          </a:prstGeom>
+          <a:noFill/>
+        </p:spPr>
+        <p:txBody>
+          <a:bodyPr wrap="none" rtlCol="0">
+            <a:spAutoFit/>
+          </a:bodyPr>
+          <a:lstStyle/>
+          <a:p>
+            <a:r>
+              <a:rPr lang="en-CA" b="1" dirty="0" smtClean="0"/>
+              <a:t>Volunteer information Web Applet</a:t>
+            </a:r>
+            <a:r>
+              <a:rPr lang="en-CA" dirty="0" smtClean="0"/>
+              <a:t/>
+            </a:r>
+            <a:br>
+              <a:rPr lang="en-CA" dirty="0" smtClean="0"/>
+            </a:br>
+            <a:r>
+              <a:rPr lang="en-CA" dirty="0" smtClean="0"/>
+              <a:t>Assigned to: Mathew Galbraith</a:t>
+            </a:r>
+            <a:br>
+              <a:rPr lang="en-CA" dirty="0" smtClean="0"/>
+            </a:br>
+            <a:r>
+              <a:rPr lang="en-CA" dirty="0" smtClean="0"/>
+              <a:t/>
+            </a:r>
+            <a:br>
+              <a:rPr lang="en-CA" dirty="0" smtClean="0"/>
+            </a:br>
+            <a:r>
+              <a:rPr lang="en-CA" dirty="0" smtClean="0"/>
+              <a:t>Duties: Manage the interactions between </a:t>
+            </a:r>
+            <a:br>
+              <a:rPr lang="en-CA" dirty="0" smtClean="0"/>
+            </a:br>
+            <a:r>
+              <a:rPr lang="en-CA" dirty="0" smtClean="0"/>
+              <a:t>the main system and the volunteers/crew members. </a:t>
+            </a:r>
+            <a:endParaRPr lang="en-CA" dirty="0"/>
           </a:p>
         </p:txBody>
       </p:sp>
     </p:spTree>
     <p:extLst>
       <p:ext uri="{BB962C8B-B14F-4D97-AF65-F5344CB8AC3E}">
-        <p14:creationId xmlns:p14="http://schemas.microsoft.com/office/powerpoint/2010/main" val="4211642960"/>
+        <p14:creationId xmlns:p14="http://schemas.microsoft.com/office/powerpoint/2010/main" val="484295408"/>
       </p:ext>
     </p:extLst>
   </p:cSld>
   <p:clrMapOvr>
     <a:masterClrMapping/>
   </p:clrMapOvr>
+  <p:timing>
+    <p:tnLst>
+      <p:par>
+        <p:cTn id="1" dur="indefinite" restart="never" nodeType="tmRoot"/>
+      </p:par>
+    </p:tnLst>
+  </p:timing>
 </p:sld>
 </file>
 
@@ -4805,7 +5243,7 @@
           <a:p>
             <a:r>
               <a:rPr lang="en-US" dirty="0" smtClean="0"/>
-              <a:t>issues</a:t>
+              <a:t>planning</a:t>
             </a:r>
             <a:endParaRPr lang="en-US" dirty="0"/>
           </a:p>
@@ -4832,7 +5270,7 @@
             </a:pPr>
             <a:r>
               <a:rPr lang="en-US" dirty="0" smtClean="0"/>
-              <a:t>Code: Java</a:t>
+              <a:t>Weekly meetings to evaluate and discuss progress.</a:t>
             </a:r>
           </a:p>
           <a:p>
@@ -4842,13 +5280,8 @@
             </a:pPr>
             <a:r>
               <a:rPr lang="en-US" dirty="0" smtClean="0"/>
-              <a:t>IDE: </a:t>
-            </a:r>
-            <a:r>
-              <a:rPr lang="en-US" dirty="0" err="1" smtClean="0"/>
-              <a:t>Netbeans</a:t>
-            </a:r>
-            <a:endParaRPr lang="en-US" dirty="0" smtClean="0"/>
+              <a:t>Weekly goals to ensure linear progress.</a:t>
+            </a:r>
           </a:p>
           <a:p>
             <a:pPr marL="342900" indent="-342900">
@@ -4857,21 +5290,8 @@
             </a:pPr>
             <a:r>
               <a:rPr lang="en-US" dirty="0" smtClean="0"/>
-              <a:t>Source code </a:t>
-            </a:r>
-            <a:r>
-              <a:rPr lang="en-US" dirty="0" err="1" smtClean="0"/>
-              <a:t>managenment</a:t>
-            </a:r>
-            <a:r>
-              <a:rPr lang="en-US" dirty="0" smtClean="0"/>
-              <a:t>: </a:t>
-            </a:r>
-            <a:r>
-              <a:rPr lang="en-US" dirty="0" err="1" smtClean="0"/>
-              <a:t>Github</a:t>
-            </a:r>
-            <a:endParaRPr lang="en-US" dirty="0"/>
+              <a:t>Paired programming:</a:t>
+            </a:r>
           </a:p>
           <a:p>
             <a:pPr marL="800100" lvl="1" indent="-342900">
@@ -4880,21 +5300,62 @@
             </a:pPr>
             <a:r>
               <a:rPr lang="en-US" dirty="0" smtClean="0"/>
-              <a:t>Requested and received private repository due to student status!</a:t>
-            </a:r>
+              <a:t>To ensure clear understandable code.</a:t>
+            </a:r>
+          </a:p>
+          <a:p>
+            <a:pPr marL="800100" lvl="1" indent="-342900">
+              <a:buFont typeface="Arial"/>
+              <a:buChar char="•"/>
+            </a:pPr>
+            <a:r>
+              <a:rPr lang="en-US" dirty="0" smtClean="0"/>
+              <a:t>To practice working in small teams.</a:t>
+            </a:r>
+          </a:p>
+          <a:p>
+            <a:pPr marL="800100" lvl="1" indent="-342900">
+              <a:buFont typeface="Arial"/>
+              <a:buChar char="•"/>
+            </a:pPr>
+            <a:r>
+              <a:rPr lang="en-US" dirty="0" smtClean="0"/>
+              <a:t>Ensures a broader understanding of the project for each individual.</a:t>
+            </a:r>
+          </a:p>
+          <a:p>
+            <a:pPr marL="342900" indent="-342900">
+              <a:buFont typeface="Arial"/>
+              <a:buChar char="•"/>
+            </a:pPr>
+            <a:endParaRPr lang="en-US" dirty="0" smtClean="0"/>
+          </a:p>
+          <a:p>
+            <a:pPr marL="342900" indent="-342900">
+              <a:buFont typeface="Arial"/>
+              <a:buChar char="•"/>
+            </a:pPr>
+            <a:endParaRPr lang="en-US" dirty="0"/>
           </a:p>
         </p:txBody>
       </p:sp>
     </p:spTree>
     <p:extLst>
       <p:ext uri="{BB962C8B-B14F-4D97-AF65-F5344CB8AC3E}">
-        <p14:creationId xmlns:p14="http://schemas.microsoft.com/office/powerpoint/2010/main" val="3307549435"/>
+        <p14:creationId xmlns:p14="http://schemas.microsoft.com/office/powerpoint/2010/main" val="4211642960"/>
       </p:ext>
     </p:extLst>
   </p:cSld>
   <p:clrMapOvr>
     <a:masterClrMapping/>
   </p:clrMapOvr>
+  <p:timing>
+    <p:tnLst>
+      <p:par>
+        <p:cTn id="1" dur="indefinite" restart="never" nodeType="tmRoot"/>
+      </p:par>
+    </p:tnLst>
+  </p:timing>
 </p:sld>
 </file>
 
@@ -4932,7 +5393,7 @@
           <a:p>
             <a:r>
               <a:rPr lang="en-US" dirty="0" smtClean="0"/>
-              <a:t>conclusion</a:t>
+              <a:t>issues</a:t>
             </a:r>
             <a:endParaRPr lang="en-US" dirty="0"/>
           </a:p>
@@ -4950,9 +5411,7 @@
         </p:nvSpPr>
         <p:spPr/>
         <p:txBody>
-          <a:bodyPr>
-            <a:normAutofit lnSpcReduction="10000"/>
-          </a:bodyPr>
+          <a:bodyPr/>
           <a:lstStyle/>
           <a:p>
             <a:pPr marL="342900" indent="-342900">
@@ -4961,19 +5420,8 @@
             </a:pPr>
             <a:r>
               <a:rPr lang="en-US" dirty="0" smtClean="0"/>
-              <a:t>We at </a:t>
-            </a:r>
-            <a:r>
-              <a:rPr lang="en-US" dirty="0" err="1" smtClean="0"/>
-              <a:t>Achievatron</a:t>
-            </a:r>
-            <a:r>
-              <a:rPr lang="en-US" dirty="0" smtClean="0"/>
-              <a:t> Unlimited believe that this software we are creating can have real use in the private filming sector.</a:t>
-            </a:r>
-          </a:p>
-          <a:p>
-            <a:endParaRPr lang="en-US" dirty="0"/>
+              <a:t>Code: Java</a:t>
+            </a:r>
           </a:p>
           <a:p>
             <a:pPr marL="342900" indent="-342900">
@@ -4982,46 +5430,66 @@
             </a:pPr>
             <a:r>
               <a:rPr lang="en-US" dirty="0" smtClean="0"/>
-              <a:t>We chose a small target market because we want to learn to develop specific software for a unique set of needs</a:t>
-            </a:r>
+              <a:t>IDE: </a:t>
+            </a:r>
+            <a:r>
+              <a:rPr lang="en-US" dirty="0" err="1" smtClean="0"/>
+              <a:t>Netbeans</a:t>
+            </a:r>
+            <a:endParaRPr lang="en-US" dirty="0" smtClean="0"/>
           </a:p>
           <a:p>
             <a:pPr marL="342900" indent="-342900">
               <a:buFont typeface="Arial"/>
               <a:buChar char="•"/>
             </a:pPr>
+            <a:r>
+              <a:rPr lang="en-US" dirty="0" smtClean="0"/>
+              <a:t>Source code </a:t>
+            </a:r>
+            <a:r>
+              <a:rPr lang="en-US" dirty="0" err="1" smtClean="0"/>
+              <a:t>managenment</a:t>
+            </a:r>
+            <a:r>
+              <a:rPr lang="en-US" dirty="0" smtClean="0"/>
+              <a:t>: </a:t>
+            </a:r>
+            <a:r>
+              <a:rPr lang="en-US" dirty="0" err="1" smtClean="0"/>
+              <a:t>Github</a:t>
+            </a:r>
             <a:endParaRPr lang="en-US" dirty="0"/>
           </a:p>
           <a:p>
-            <a:pPr marL="342900" indent="-342900">
+            <a:pPr marL="800100" lvl="1" indent="-342900">
               <a:buFont typeface="Arial"/>
               <a:buChar char="•"/>
             </a:pPr>
             <a:r>
               <a:rPr lang="en-US" dirty="0" smtClean="0"/>
-              <a:t>If it appears we have not been ambitious enough remember, promise a little but give a lot. This presentation has outlined *only* what we feel we can reasonably and comfortably create given the time restrictions for this class. It has not included some of our more high </a:t>
-            </a:r>
-            <a:r>
-              <a:rPr lang="en-US" smtClean="0"/>
-              <a:t>reaching goals. </a:t>
-            </a:r>
-            <a:endParaRPr lang="en-US" dirty="0"/>
-          </a:p>
-          <a:p>
-            <a:endParaRPr lang="en-US" dirty="0"/>
+              <a:t>Requested and received private repository due to student status!</a:t>
+            </a:r>
           </a:p>
         </p:txBody>
       </p:sp>
     </p:spTree>
     <p:extLst>
       <p:ext uri="{BB962C8B-B14F-4D97-AF65-F5344CB8AC3E}">
-        <p14:creationId xmlns:p14="http://schemas.microsoft.com/office/powerpoint/2010/main" val="1048451117"/>
+        <p14:creationId xmlns:p14="http://schemas.microsoft.com/office/powerpoint/2010/main" val="3307549435"/>
       </p:ext>
     </p:extLst>
   </p:cSld>
   <p:clrMapOvr>
     <a:masterClrMapping/>
   </p:clrMapOvr>
+  <p:timing>
+    <p:tnLst>
+      <p:par>
+        <p:cTn id="1" dur="indefinite" restart="never" nodeType="tmRoot"/>
+      </p:par>
+    </p:tnLst>
+  </p:timing>
 </p:sld>
 </file>
 

</xml_diff>